<commit_message>
[변경사항] * Splash 화면 추가 * Alt + Right : 선택된 node가 이미 expand 되어 있으면 child first node를 선택 하도록 함 * Alt + Left : 선택된 node가 이미 collapse 되어 있으면 부모 node를 선택
[Version]
  - AssemblyInfo : 0.5.3.0
  - XML : 0.5.1.0
  - Install Package : 0.5.1.0
</commit_message>
<xml_diff>
--- a/Resources/Icon/Icon.pptx
+++ b/Resources/Icon/Icon.pptx
@@ -6,10 +6,11 @@
   </p:sldMasterIdLst>
   <p:sldIdLst>
     <p:sldId id="256" r:id="rId2"/>
-    <p:sldId id="257" r:id="rId3"/>
-    <p:sldId id="258" r:id="rId4"/>
-    <p:sldId id="260" r:id="rId5"/>
-    <p:sldId id="261" r:id="rId6"/>
+    <p:sldId id="262" r:id="rId3"/>
+    <p:sldId id="257" r:id="rId4"/>
+    <p:sldId id="258" r:id="rId5"/>
+    <p:sldId id="260" r:id="rId6"/>
+    <p:sldId id="261" r:id="rId7"/>
   </p:sldIdLst>
   <p:sldSz cx="12192000" cy="6858000"/>
   <p:notesSz cx="6858000" cy="9144000"/>
@@ -247,7 +248,7 @@
           <a:p>
             <a:fld id="{D7F79187-E0C0-4F2A-A0F0-8B5DFD9CA2AA}" type="datetimeFigureOut">
               <a:rPr lang="ko-KR" altLang="en-US" smtClean="0"/>
-              <a:t>2019-05-02</a:t>
+              <a:t>2019-09-03</a:t>
             </a:fld>
             <a:endParaRPr lang="ko-KR" altLang="en-US"/>
           </a:p>
@@ -417,7 +418,7 @@
           <a:p>
             <a:fld id="{D7F79187-E0C0-4F2A-A0F0-8B5DFD9CA2AA}" type="datetimeFigureOut">
               <a:rPr lang="ko-KR" altLang="en-US" smtClean="0"/>
-              <a:t>2019-05-02</a:t>
+              <a:t>2019-09-03</a:t>
             </a:fld>
             <a:endParaRPr lang="ko-KR" altLang="en-US"/>
           </a:p>
@@ -597,7 +598,7 @@
           <a:p>
             <a:fld id="{D7F79187-E0C0-4F2A-A0F0-8B5DFD9CA2AA}" type="datetimeFigureOut">
               <a:rPr lang="ko-KR" altLang="en-US" smtClean="0"/>
-              <a:t>2019-05-02</a:t>
+              <a:t>2019-09-03</a:t>
             </a:fld>
             <a:endParaRPr lang="ko-KR" altLang="en-US"/>
           </a:p>
@@ -767,7 +768,7 @@
           <a:p>
             <a:fld id="{D7F79187-E0C0-4F2A-A0F0-8B5DFD9CA2AA}" type="datetimeFigureOut">
               <a:rPr lang="ko-KR" altLang="en-US" smtClean="0"/>
-              <a:t>2019-05-02</a:t>
+              <a:t>2019-09-03</a:t>
             </a:fld>
             <a:endParaRPr lang="ko-KR" altLang="en-US"/>
           </a:p>
@@ -1013,7 +1014,7 @@
           <a:p>
             <a:fld id="{D7F79187-E0C0-4F2A-A0F0-8B5DFD9CA2AA}" type="datetimeFigureOut">
               <a:rPr lang="ko-KR" altLang="en-US" smtClean="0"/>
-              <a:t>2019-05-02</a:t>
+              <a:t>2019-09-03</a:t>
             </a:fld>
             <a:endParaRPr lang="ko-KR" altLang="en-US"/>
           </a:p>
@@ -1245,7 +1246,7 @@
           <a:p>
             <a:fld id="{D7F79187-E0C0-4F2A-A0F0-8B5DFD9CA2AA}" type="datetimeFigureOut">
               <a:rPr lang="ko-KR" altLang="en-US" smtClean="0"/>
-              <a:t>2019-05-02</a:t>
+              <a:t>2019-09-03</a:t>
             </a:fld>
             <a:endParaRPr lang="ko-KR" altLang="en-US"/>
           </a:p>
@@ -1612,7 +1613,7 @@
           <a:p>
             <a:fld id="{D7F79187-E0C0-4F2A-A0F0-8B5DFD9CA2AA}" type="datetimeFigureOut">
               <a:rPr lang="ko-KR" altLang="en-US" smtClean="0"/>
-              <a:t>2019-05-02</a:t>
+              <a:t>2019-09-03</a:t>
             </a:fld>
             <a:endParaRPr lang="ko-KR" altLang="en-US"/>
           </a:p>
@@ -1730,7 +1731,7 @@
           <a:p>
             <a:fld id="{D7F79187-E0C0-4F2A-A0F0-8B5DFD9CA2AA}" type="datetimeFigureOut">
               <a:rPr lang="ko-KR" altLang="en-US" smtClean="0"/>
-              <a:t>2019-05-02</a:t>
+              <a:t>2019-09-03</a:t>
             </a:fld>
             <a:endParaRPr lang="ko-KR" altLang="en-US"/>
           </a:p>
@@ -1825,7 +1826,7 @@
           <a:p>
             <a:fld id="{D7F79187-E0C0-4F2A-A0F0-8B5DFD9CA2AA}" type="datetimeFigureOut">
               <a:rPr lang="ko-KR" altLang="en-US" smtClean="0"/>
-              <a:t>2019-05-02</a:t>
+              <a:t>2019-09-03</a:t>
             </a:fld>
             <a:endParaRPr lang="ko-KR" altLang="en-US"/>
           </a:p>
@@ -2102,7 +2103,7 @@
           <a:p>
             <a:fld id="{D7F79187-E0C0-4F2A-A0F0-8B5DFD9CA2AA}" type="datetimeFigureOut">
               <a:rPr lang="ko-KR" altLang="en-US" smtClean="0"/>
-              <a:t>2019-05-02</a:t>
+              <a:t>2019-09-03</a:t>
             </a:fld>
             <a:endParaRPr lang="ko-KR" altLang="en-US"/>
           </a:p>
@@ -2355,7 +2356,7 @@
           <a:p>
             <a:fld id="{D7F79187-E0C0-4F2A-A0F0-8B5DFD9CA2AA}" type="datetimeFigureOut">
               <a:rPr lang="ko-KR" altLang="en-US" smtClean="0"/>
-              <a:t>2019-05-02</a:t>
+              <a:t>2019-09-03</a:t>
             </a:fld>
             <a:endParaRPr lang="ko-KR" altLang="en-US"/>
           </a:p>
@@ -2568,7 +2569,7 @@
           <a:p>
             <a:fld id="{D7F79187-E0C0-4F2A-A0F0-8B5DFD9CA2AA}" type="datetimeFigureOut">
               <a:rPr lang="ko-KR" altLang="en-US" smtClean="0"/>
-              <a:t>2019-05-02</a:t>
+              <a:t>2019-09-03</a:t>
             </a:fld>
             <a:endParaRPr lang="ko-KR" altLang="en-US"/>
           </a:p>
@@ -3132,6 +3133,179 @@
       </p:grpSpPr>
       <p:grpSp>
         <p:nvGrpSpPr>
+          <p:cNvPr id="5" name="그룹 4"/>
+          <p:cNvGrpSpPr/>
+          <p:nvPr/>
+        </p:nvGrpSpPr>
+        <p:grpSpPr>
+          <a:xfrm>
+            <a:off x="839416" y="1919028"/>
+            <a:ext cx="10959388" cy="2309462"/>
+            <a:chOff x="839416" y="1919028"/>
+            <a:chExt cx="10959388" cy="2309462"/>
+          </a:xfrm>
+        </p:grpSpPr>
+        <p:sp>
+          <p:nvSpPr>
+            <p:cNvPr id="4" name="직사각형 3"/>
+            <p:cNvSpPr/>
+            <p:nvPr/>
+          </p:nvSpPr>
+          <p:spPr>
+            <a:xfrm>
+              <a:off x="911424" y="1988840"/>
+              <a:ext cx="10153128" cy="2160240"/>
+            </a:xfrm>
+            <a:prstGeom prst="rect">
+              <a:avLst/>
+            </a:prstGeom>
+            <a:solidFill>
+              <a:schemeClr val="bg1"/>
+            </a:solidFill>
+            <a:ln>
+              <a:noFill/>
+            </a:ln>
+          </p:spPr>
+          <p:style>
+            <a:lnRef idx="2">
+              <a:schemeClr val="accent1">
+                <a:shade val="50000"/>
+              </a:schemeClr>
+            </a:lnRef>
+            <a:fillRef idx="1">
+              <a:schemeClr val="accent1"/>
+            </a:fillRef>
+            <a:effectRef idx="0">
+              <a:schemeClr val="accent1"/>
+            </a:effectRef>
+            <a:fontRef idx="minor">
+              <a:schemeClr val="lt1"/>
+            </a:fontRef>
+          </p:style>
+          <p:txBody>
+            <a:bodyPr rtlCol="0" anchor="ctr"/>
+            <a:lstStyle/>
+            <a:p>
+              <a:pPr algn="ctr"/>
+              <a:endParaRPr lang="ko-KR" altLang="en-US"/>
+            </a:p>
+          </p:txBody>
+        </p:sp>
+        <p:sp>
+          <p:nvSpPr>
+            <p:cNvPr id="2" name="TextBox 1"/>
+            <p:cNvSpPr txBox="1"/>
+            <p:nvPr/>
+          </p:nvSpPr>
+          <p:spPr>
+            <a:xfrm>
+              <a:off x="3431704" y="1988840"/>
+              <a:ext cx="8367100" cy="2160240"/>
+            </a:xfrm>
+            <a:prstGeom prst="rect">
+              <a:avLst/>
+            </a:prstGeom>
+            <a:noFill/>
+          </p:spPr>
+          <p:txBody>
+            <a:bodyPr wrap="square" rtlCol="0" anchor="ctr">
+              <a:noAutofit/>
+            </a:bodyPr>
+            <a:lstStyle/>
+            <a:p>
+              <a:r>
+                <a:rPr lang="en-US" altLang="ko-KR" sz="15000" dirty="0" smtClean="0">
+                  <a:solidFill>
+                    <a:srgbClr val="2E75B6"/>
+                  </a:solidFill>
+                  <a:effectLst>
+                    <a:outerShdw blurRad="38100" dist="38100" dir="2700000" algn="tl">
+                      <a:srgbClr val="000000">
+                        <a:alpha val="43137"/>
+                      </a:srgbClr>
+                    </a:outerShdw>
+                  </a:effectLst>
+                </a:rPr>
+                <a:t>Shortcut</a:t>
+              </a:r>
+              <a:endParaRPr lang="ko-KR" altLang="en-US" sz="15000">
+                <a:solidFill>
+                  <a:srgbClr val="2E75B6"/>
+                </a:solidFill>
+                <a:effectLst>
+                  <a:outerShdw blurRad="38100" dist="38100" dir="2700000" algn="tl">
+                    <a:srgbClr val="000000">
+                      <a:alpha val="43137"/>
+                    </a:srgbClr>
+                  </a:outerShdw>
+                </a:effectLst>
+              </a:endParaRPr>
+            </a:p>
+          </p:txBody>
+        </p:sp>
+        <p:pic>
+          <p:nvPicPr>
+            <p:cNvPr id="3" name="그림 2"/>
+            <p:cNvPicPr>
+              <a:picLocks noChangeAspect="1"/>
+            </p:cNvPicPr>
+            <p:nvPr/>
+          </p:nvPicPr>
+          <p:blipFill>
+            <a:blip r:embed="rId2" cstate="print">
+              <a:extLst>
+                <a:ext uri="{28A0092B-C50C-407E-A947-70E740481C1C}">
+                  <a14:useLocalDpi xmlns:a14="http://schemas.microsoft.com/office/drawing/2010/main" val="0"/>
+                </a:ext>
+              </a:extLst>
+            </a:blip>
+            <a:stretch>
+              <a:fillRect/>
+            </a:stretch>
+          </p:blipFill>
+          <p:spPr>
+            <a:xfrm>
+              <a:off x="839416" y="1919028"/>
+              <a:ext cx="2307340" cy="2309462"/>
+            </a:xfrm>
+            <a:prstGeom prst="rect">
+              <a:avLst/>
+            </a:prstGeom>
+          </p:spPr>
+        </p:pic>
+      </p:grpSp>
+    </p:spTree>
+    <p:extLst>
+      <p:ext uri="{BB962C8B-B14F-4D97-AF65-F5344CB8AC3E}">
+        <p14:creationId xmlns:p14="http://schemas.microsoft.com/office/powerpoint/2010/main" val="1508389967"/>
+      </p:ext>
+    </p:extLst>
+  </p:cSld>
+  <p:clrMapOvr>
+    <a:masterClrMapping/>
+  </p:clrMapOvr>
+</p:sld>
+</file>
+
+<file path=ppt/slides/slide3.xml><?xml version="1.0" encoding="utf-8"?>
+<p:sld xmlns:a="http://schemas.openxmlformats.org/drawingml/2006/main" xmlns:r="http://schemas.openxmlformats.org/officeDocument/2006/relationships" xmlns:p="http://schemas.openxmlformats.org/presentationml/2006/main">
+  <p:cSld>
+    <p:spTree>
+      <p:nvGrpSpPr>
+        <p:cNvPr id="1" name=""/>
+        <p:cNvGrpSpPr/>
+        <p:nvPr/>
+      </p:nvGrpSpPr>
+      <p:grpSpPr>
+        <a:xfrm>
+          <a:off x="0" y="0"/>
+          <a:ext cx="0" cy="0"/>
+          <a:chOff x="0" y="0"/>
+          <a:chExt cx="0" cy="0"/>
+        </a:xfrm>
+      </p:grpSpPr>
+      <p:grpSp>
+        <p:nvGrpSpPr>
           <p:cNvPr id="11" name="그룹 10"/>
           <p:cNvGrpSpPr/>
           <p:nvPr/>
@@ -3296,7 +3470,7 @@
 </p:sld>
 </file>
 
-<file path=ppt/slides/slide3.xml><?xml version="1.0" encoding="utf-8"?>
+<file path=ppt/slides/slide4.xml><?xml version="1.0" encoding="utf-8"?>
 <p:sld xmlns:a="http://schemas.openxmlformats.org/drawingml/2006/main" xmlns:r="http://schemas.openxmlformats.org/officeDocument/2006/relationships" xmlns:p="http://schemas.openxmlformats.org/presentationml/2006/main">
   <p:cSld>
     <p:spTree>
@@ -4008,7 +4182,7 @@
 </p:sld>
 </file>
 
-<file path=ppt/slides/slide4.xml><?xml version="1.0" encoding="utf-8"?>
+<file path=ppt/slides/slide5.xml><?xml version="1.0" encoding="utf-8"?>
 <p:sld xmlns:a="http://schemas.openxmlformats.org/drawingml/2006/main" xmlns:r="http://schemas.openxmlformats.org/officeDocument/2006/relationships" xmlns:p="http://schemas.openxmlformats.org/presentationml/2006/main">
   <p:cSld>
     <p:spTree>
@@ -4191,7 +4365,7 @@
 </p:sld>
 </file>
 
-<file path=ppt/slides/slide5.xml><?xml version="1.0" encoding="utf-8"?>
+<file path=ppt/slides/slide6.xml><?xml version="1.0" encoding="utf-8"?>
 <p:sld xmlns:a="http://schemas.openxmlformats.org/drawingml/2006/main" xmlns:r="http://schemas.openxmlformats.org/officeDocument/2006/relationships" xmlns:p="http://schemas.openxmlformats.org/presentationml/2006/main">
   <p:cSld>
     <p:spTree>

</xml_diff>

<commit_message>
[변경사항] 1. Node 선택하고 mouse 오른쪽 click 하면 윈도우 탐색기의 context menu가 open되도록 함 2. Tool Strip Menu 적용 : Add, Delete, Edit 3. Icon 추가 : Add, Delete, Edit
[Version]
  - AssemblyInfo : 0.5.3.1 -> 0.6.0.1
  - XML : 0.5.1.0 -> 0.6.0.1
  - Install Package : 0.5.1.0 -> 0.6.0.1
</commit_message>
<xml_diff>
--- a/Resources/Icon/Icon.pptx
+++ b/Resources/Icon/Icon.pptx
@@ -11,6 +11,8 @@
     <p:sldId id="258" r:id="rId5"/>
     <p:sldId id="260" r:id="rId6"/>
     <p:sldId id="261" r:id="rId7"/>
+    <p:sldId id="263" r:id="rId8"/>
+    <p:sldId id="264" r:id="rId9"/>
   </p:sldIdLst>
   <p:sldSz cx="12192000" cy="6858000"/>
   <p:notesSz cx="6858000" cy="9144000"/>
@@ -248,7 +250,7 @@
           <a:p>
             <a:fld id="{D7F79187-E0C0-4F2A-A0F0-8B5DFD9CA2AA}" type="datetimeFigureOut">
               <a:rPr lang="ko-KR" altLang="en-US" smtClean="0"/>
-              <a:t>2019-09-03</a:t>
+              <a:t>2020-03-05</a:t>
             </a:fld>
             <a:endParaRPr lang="ko-KR" altLang="en-US"/>
           </a:p>
@@ -418,7 +420,7 @@
           <a:p>
             <a:fld id="{D7F79187-E0C0-4F2A-A0F0-8B5DFD9CA2AA}" type="datetimeFigureOut">
               <a:rPr lang="ko-KR" altLang="en-US" smtClean="0"/>
-              <a:t>2019-09-03</a:t>
+              <a:t>2020-03-05</a:t>
             </a:fld>
             <a:endParaRPr lang="ko-KR" altLang="en-US"/>
           </a:p>
@@ -598,7 +600,7 @@
           <a:p>
             <a:fld id="{D7F79187-E0C0-4F2A-A0F0-8B5DFD9CA2AA}" type="datetimeFigureOut">
               <a:rPr lang="ko-KR" altLang="en-US" smtClean="0"/>
-              <a:t>2019-09-03</a:t>
+              <a:t>2020-03-05</a:t>
             </a:fld>
             <a:endParaRPr lang="ko-KR" altLang="en-US"/>
           </a:p>
@@ -768,7 +770,7 @@
           <a:p>
             <a:fld id="{D7F79187-E0C0-4F2A-A0F0-8B5DFD9CA2AA}" type="datetimeFigureOut">
               <a:rPr lang="ko-KR" altLang="en-US" smtClean="0"/>
-              <a:t>2019-09-03</a:t>
+              <a:t>2020-03-05</a:t>
             </a:fld>
             <a:endParaRPr lang="ko-KR" altLang="en-US"/>
           </a:p>
@@ -1014,7 +1016,7 @@
           <a:p>
             <a:fld id="{D7F79187-E0C0-4F2A-A0F0-8B5DFD9CA2AA}" type="datetimeFigureOut">
               <a:rPr lang="ko-KR" altLang="en-US" smtClean="0"/>
-              <a:t>2019-09-03</a:t>
+              <a:t>2020-03-05</a:t>
             </a:fld>
             <a:endParaRPr lang="ko-KR" altLang="en-US"/>
           </a:p>
@@ -1246,7 +1248,7 @@
           <a:p>
             <a:fld id="{D7F79187-E0C0-4F2A-A0F0-8B5DFD9CA2AA}" type="datetimeFigureOut">
               <a:rPr lang="ko-KR" altLang="en-US" smtClean="0"/>
-              <a:t>2019-09-03</a:t>
+              <a:t>2020-03-05</a:t>
             </a:fld>
             <a:endParaRPr lang="ko-KR" altLang="en-US"/>
           </a:p>
@@ -1613,7 +1615,7 @@
           <a:p>
             <a:fld id="{D7F79187-E0C0-4F2A-A0F0-8B5DFD9CA2AA}" type="datetimeFigureOut">
               <a:rPr lang="ko-KR" altLang="en-US" smtClean="0"/>
-              <a:t>2019-09-03</a:t>
+              <a:t>2020-03-05</a:t>
             </a:fld>
             <a:endParaRPr lang="ko-KR" altLang="en-US"/>
           </a:p>
@@ -1731,7 +1733,7 @@
           <a:p>
             <a:fld id="{D7F79187-E0C0-4F2A-A0F0-8B5DFD9CA2AA}" type="datetimeFigureOut">
               <a:rPr lang="ko-KR" altLang="en-US" smtClean="0"/>
-              <a:t>2019-09-03</a:t>
+              <a:t>2020-03-05</a:t>
             </a:fld>
             <a:endParaRPr lang="ko-KR" altLang="en-US"/>
           </a:p>
@@ -1826,7 +1828,7 @@
           <a:p>
             <a:fld id="{D7F79187-E0C0-4F2A-A0F0-8B5DFD9CA2AA}" type="datetimeFigureOut">
               <a:rPr lang="ko-KR" altLang="en-US" smtClean="0"/>
-              <a:t>2019-09-03</a:t>
+              <a:t>2020-03-05</a:t>
             </a:fld>
             <a:endParaRPr lang="ko-KR" altLang="en-US"/>
           </a:p>
@@ -2103,7 +2105,7 @@
           <a:p>
             <a:fld id="{D7F79187-E0C0-4F2A-A0F0-8B5DFD9CA2AA}" type="datetimeFigureOut">
               <a:rPr lang="ko-KR" altLang="en-US" smtClean="0"/>
-              <a:t>2019-09-03</a:t>
+              <a:t>2020-03-05</a:t>
             </a:fld>
             <a:endParaRPr lang="ko-KR" altLang="en-US"/>
           </a:p>
@@ -2356,7 +2358,7 @@
           <a:p>
             <a:fld id="{D7F79187-E0C0-4F2A-A0F0-8B5DFD9CA2AA}" type="datetimeFigureOut">
               <a:rPr lang="ko-KR" altLang="en-US" smtClean="0"/>
-              <a:t>2019-09-03</a:t>
+              <a:t>2020-03-05</a:t>
             </a:fld>
             <a:endParaRPr lang="ko-KR" altLang="en-US"/>
           </a:p>
@@ -2569,7 +2571,7 @@
           <a:p>
             <a:fld id="{D7F79187-E0C0-4F2A-A0F0-8B5DFD9CA2AA}" type="datetimeFigureOut">
               <a:rPr lang="ko-KR" altLang="en-US" smtClean="0"/>
-              <a:t>2019-09-03</a:t>
+              <a:t>2020-03-05</a:t>
             </a:fld>
             <a:endParaRPr lang="ko-KR" altLang="en-US"/>
           </a:p>
@@ -4730,6 +4732,515 @@
 </p:sld>
 </file>
 
+<file path=ppt/slides/slide7.xml><?xml version="1.0" encoding="utf-8"?>
+<p:sld xmlns:a="http://schemas.openxmlformats.org/drawingml/2006/main" xmlns:r="http://schemas.openxmlformats.org/officeDocument/2006/relationships" xmlns:p="http://schemas.openxmlformats.org/presentationml/2006/main">
+  <p:cSld>
+    <p:spTree>
+      <p:nvGrpSpPr>
+        <p:cNvPr id="1" name=""/>
+        <p:cNvGrpSpPr/>
+        <p:nvPr/>
+      </p:nvGrpSpPr>
+      <p:grpSpPr>
+        <a:xfrm>
+          <a:off x="0" y="0"/>
+          <a:ext cx="0" cy="0"/>
+          <a:chOff x="0" y="0"/>
+          <a:chExt cx="0" cy="0"/>
+        </a:xfrm>
+      </p:grpSpPr>
+      <p:sp>
+        <p:nvSpPr>
+          <p:cNvPr id="5" name="직사각형 4"/>
+          <p:cNvSpPr/>
+          <p:nvPr/>
+        </p:nvSpPr>
+        <p:spPr>
+          <a:xfrm>
+            <a:off x="2877083" y="222971"/>
+            <a:ext cx="6441743" cy="6426643"/>
+          </a:xfrm>
+          <a:prstGeom prst="rect">
+            <a:avLst/>
+          </a:prstGeom>
+          <a:noFill/>
+          <a:ln w="190500">
+            <a:solidFill>
+              <a:schemeClr val="bg1"/>
+            </a:solidFill>
+          </a:ln>
+        </p:spPr>
+        <p:style>
+          <a:lnRef idx="2">
+            <a:schemeClr val="accent1">
+              <a:shade val="50000"/>
+            </a:schemeClr>
+          </a:lnRef>
+          <a:fillRef idx="1">
+            <a:schemeClr val="accent1"/>
+          </a:fillRef>
+          <a:effectRef idx="0">
+            <a:schemeClr val="accent1"/>
+          </a:effectRef>
+          <a:fontRef idx="minor">
+            <a:schemeClr val="lt1"/>
+          </a:fontRef>
+        </p:style>
+        <p:txBody>
+          <a:bodyPr rtlCol="0" anchor="ctr"/>
+          <a:lstStyle/>
+          <a:p>
+            <a:pPr algn="ctr"/>
+            <a:endParaRPr lang="ko-KR" altLang="en-US"/>
+          </a:p>
+        </p:txBody>
+      </p:sp>
+      <p:grpSp>
+        <p:nvGrpSpPr>
+          <p:cNvPr id="6" name="그룹 5"/>
+          <p:cNvGrpSpPr/>
+          <p:nvPr/>
+        </p:nvGrpSpPr>
+        <p:grpSpPr>
+          <a:xfrm>
+            <a:off x="3420117" y="830182"/>
+            <a:ext cx="5556203" cy="5551146"/>
+            <a:chOff x="3420117" y="830182"/>
+            <a:chExt cx="5556203" cy="5551146"/>
+          </a:xfrm>
+        </p:grpSpPr>
+        <p:grpSp>
+          <p:nvGrpSpPr>
+            <p:cNvPr id="18" name="그룹 17"/>
+            <p:cNvGrpSpPr/>
+            <p:nvPr/>
+          </p:nvGrpSpPr>
+          <p:grpSpPr>
+            <a:xfrm>
+              <a:off x="3628465" y="1033473"/>
+              <a:ext cx="5347855" cy="5347855"/>
+              <a:chOff x="3420117" y="830182"/>
+              <a:chExt cx="5347855" cy="5347855"/>
+            </a:xfrm>
+            <a:solidFill>
+              <a:schemeClr val="bg1">
+                <a:lumMod val="50000"/>
+              </a:schemeClr>
+            </a:solidFill>
+            <a:effectLst/>
+          </p:grpSpPr>
+          <p:sp>
+            <p:nvSpPr>
+              <p:cNvPr id="19" name="직사각형 18"/>
+              <p:cNvSpPr/>
+              <p:nvPr/>
+            </p:nvSpPr>
+            <p:spPr>
+              <a:xfrm rot="16200000" flipV="1">
+                <a:off x="3424027" y="2785986"/>
+                <a:ext cx="5347855" cy="1436248"/>
+              </a:xfrm>
+              <a:prstGeom prst="rect">
+                <a:avLst/>
+              </a:prstGeom>
+              <a:grpFill/>
+              <a:ln>
+                <a:noFill/>
+              </a:ln>
+            </p:spPr>
+            <p:style>
+              <a:lnRef idx="2">
+                <a:schemeClr val="accent1">
+                  <a:shade val="50000"/>
+                </a:schemeClr>
+              </a:lnRef>
+              <a:fillRef idx="1">
+                <a:schemeClr val="accent1"/>
+              </a:fillRef>
+              <a:effectRef idx="0">
+                <a:schemeClr val="accent1"/>
+              </a:effectRef>
+              <a:fontRef idx="minor">
+                <a:schemeClr val="lt1"/>
+              </a:fontRef>
+            </p:style>
+            <p:txBody>
+              <a:bodyPr rtlCol="0" anchor="ctr"/>
+              <a:lstStyle/>
+              <a:p>
+                <a:pPr algn="ctr"/>
+                <a:endParaRPr lang="ko-KR" altLang="en-US"/>
+              </a:p>
+            </p:txBody>
+          </p:sp>
+          <p:sp>
+            <p:nvSpPr>
+              <p:cNvPr id="20" name="직사각형 19"/>
+              <p:cNvSpPr/>
+              <p:nvPr/>
+            </p:nvSpPr>
+            <p:spPr>
+              <a:xfrm rot="10800000" flipV="1">
+                <a:off x="3420117" y="2792516"/>
+                <a:ext cx="5347855" cy="1436248"/>
+              </a:xfrm>
+              <a:prstGeom prst="rect">
+                <a:avLst/>
+              </a:prstGeom>
+              <a:grpFill/>
+              <a:ln>
+                <a:noFill/>
+              </a:ln>
+            </p:spPr>
+            <p:style>
+              <a:lnRef idx="2">
+                <a:schemeClr val="accent1">
+                  <a:shade val="50000"/>
+                </a:schemeClr>
+              </a:lnRef>
+              <a:fillRef idx="1">
+                <a:schemeClr val="accent1"/>
+              </a:fillRef>
+              <a:effectRef idx="0">
+                <a:schemeClr val="accent1"/>
+              </a:effectRef>
+              <a:fontRef idx="minor">
+                <a:schemeClr val="lt1"/>
+              </a:fontRef>
+            </p:style>
+            <p:txBody>
+              <a:bodyPr rtlCol="0" anchor="ctr"/>
+              <a:lstStyle/>
+              <a:p>
+                <a:pPr algn="ctr"/>
+                <a:endParaRPr lang="ko-KR" altLang="en-US"/>
+              </a:p>
+            </p:txBody>
+          </p:sp>
+        </p:grpSp>
+        <p:grpSp>
+          <p:nvGrpSpPr>
+            <p:cNvPr id="3" name="그룹 2"/>
+            <p:cNvGrpSpPr/>
+            <p:nvPr/>
+          </p:nvGrpSpPr>
+          <p:grpSpPr>
+            <a:xfrm>
+              <a:off x="3420117" y="830182"/>
+              <a:ext cx="5347855" cy="5347855"/>
+              <a:chOff x="3420117" y="830182"/>
+              <a:chExt cx="5347855" cy="5347855"/>
+            </a:xfrm>
+            <a:effectLst/>
+          </p:grpSpPr>
+          <p:sp>
+            <p:nvSpPr>
+              <p:cNvPr id="10" name="직사각형 9"/>
+              <p:cNvSpPr/>
+              <p:nvPr/>
+            </p:nvSpPr>
+            <p:spPr>
+              <a:xfrm rot="16200000" flipV="1">
+                <a:off x="3424027" y="2785986"/>
+                <a:ext cx="5347855" cy="1436248"/>
+              </a:xfrm>
+              <a:prstGeom prst="rect">
+                <a:avLst/>
+              </a:prstGeom>
+              <a:solidFill>
+                <a:srgbClr val="2E75B6"/>
+              </a:solidFill>
+              <a:ln>
+                <a:noFill/>
+              </a:ln>
+            </p:spPr>
+            <p:style>
+              <a:lnRef idx="2">
+                <a:schemeClr val="accent1">
+                  <a:shade val="50000"/>
+                </a:schemeClr>
+              </a:lnRef>
+              <a:fillRef idx="1">
+                <a:schemeClr val="accent1"/>
+              </a:fillRef>
+              <a:effectRef idx="0">
+                <a:schemeClr val="accent1"/>
+              </a:effectRef>
+              <a:fontRef idx="minor">
+                <a:schemeClr val="lt1"/>
+              </a:fontRef>
+            </p:style>
+            <p:txBody>
+              <a:bodyPr rtlCol="0" anchor="ctr"/>
+              <a:lstStyle/>
+              <a:p>
+                <a:pPr algn="ctr"/>
+                <a:endParaRPr lang="ko-KR" altLang="en-US"/>
+              </a:p>
+            </p:txBody>
+          </p:sp>
+          <p:sp>
+            <p:nvSpPr>
+              <p:cNvPr id="9" name="직사각형 8"/>
+              <p:cNvSpPr/>
+              <p:nvPr/>
+            </p:nvSpPr>
+            <p:spPr>
+              <a:xfrm rot="10800000" flipV="1">
+                <a:off x="3420117" y="2792516"/>
+                <a:ext cx="5347855" cy="1436248"/>
+              </a:xfrm>
+              <a:prstGeom prst="rect">
+                <a:avLst/>
+              </a:prstGeom>
+              <a:solidFill>
+                <a:srgbClr val="2E75B6"/>
+              </a:solidFill>
+              <a:ln>
+                <a:noFill/>
+              </a:ln>
+            </p:spPr>
+            <p:style>
+              <a:lnRef idx="2">
+                <a:schemeClr val="accent1">
+                  <a:shade val="50000"/>
+                </a:schemeClr>
+              </a:lnRef>
+              <a:fillRef idx="1">
+                <a:schemeClr val="accent1"/>
+              </a:fillRef>
+              <a:effectRef idx="0">
+                <a:schemeClr val="accent1"/>
+              </a:effectRef>
+              <a:fontRef idx="minor">
+                <a:schemeClr val="lt1"/>
+              </a:fontRef>
+            </p:style>
+            <p:txBody>
+              <a:bodyPr rtlCol="0" anchor="ctr"/>
+              <a:lstStyle/>
+              <a:p>
+                <a:pPr algn="ctr"/>
+                <a:endParaRPr lang="ko-KR" altLang="en-US"/>
+              </a:p>
+            </p:txBody>
+          </p:sp>
+        </p:grpSp>
+      </p:grpSp>
+    </p:spTree>
+    <p:extLst>
+      <p:ext uri="{BB962C8B-B14F-4D97-AF65-F5344CB8AC3E}">
+        <p14:creationId xmlns:p14="http://schemas.microsoft.com/office/powerpoint/2010/main" val="253384370"/>
+      </p:ext>
+    </p:extLst>
+  </p:cSld>
+  <p:clrMapOvr>
+    <a:masterClrMapping/>
+  </p:clrMapOvr>
+  <p:timing>
+    <p:tnLst>
+      <p:par>
+        <p:cTn id="1" dur="indefinite" restart="never" nodeType="tmRoot"/>
+      </p:par>
+    </p:tnLst>
+  </p:timing>
+</p:sld>
+</file>
+
+<file path=ppt/slides/slide8.xml><?xml version="1.0" encoding="utf-8"?>
+<p:sld xmlns:a="http://schemas.openxmlformats.org/drawingml/2006/main" xmlns:r="http://schemas.openxmlformats.org/officeDocument/2006/relationships" xmlns:p="http://schemas.openxmlformats.org/presentationml/2006/main">
+  <p:cSld>
+    <p:spTree>
+      <p:nvGrpSpPr>
+        <p:cNvPr id="1" name=""/>
+        <p:cNvGrpSpPr/>
+        <p:nvPr/>
+      </p:nvGrpSpPr>
+      <p:grpSpPr>
+        <a:xfrm>
+          <a:off x="0" y="0"/>
+          <a:ext cx="0" cy="0"/>
+          <a:chOff x="0" y="0"/>
+          <a:chExt cx="0" cy="0"/>
+        </a:xfrm>
+      </p:grpSpPr>
+      <p:sp>
+        <p:nvSpPr>
+          <p:cNvPr id="5" name="직사각형 4"/>
+          <p:cNvSpPr/>
+          <p:nvPr/>
+        </p:nvSpPr>
+        <p:spPr>
+          <a:xfrm>
+            <a:off x="2877083" y="222971"/>
+            <a:ext cx="6441743" cy="6426643"/>
+          </a:xfrm>
+          <a:prstGeom prst="rect">
+            <a:avLst/>
+          </a:prstGeom>
+          <a:noFill/>
+          <a:ln w="190500">
+            <a:solidFill>
+              <a:schemeClr val="bg1"/>
+            </a:solidFill>
+          </a:ln>
+        </p:spPr>
+        <p:style>
+          <a:lnRef idx="2">
+            <a:schemeClr val="accent1">
+              <a:shade val="50000"/>
+            </a:schemeClr>
+          </a:lnRef>
+          <a:fillRef idx="1">
+            <a:schemeClr val="accent1"/>
+          </a:fillRef>
+          <a:effectRef idx="0">
+            <a:schemeClr val="accent1"/>
+          </a:effectRef>
+          <a:fontRef idx="minor">
+            <a:schemeClr val="lt1"/>
+          </a:fontRef>
+        </p:style>
+        <p:txBody>
+          <a:bodyPr rtlCol="0" anchor="ctr"/>
+          <a:lstStyle/>
+          <a:p>
+            <a:pPr algn="ctr"/>
+            <a:endParaRPr lang="ko-KR" altLang="en-US"/>
+          </a:p>
+        </p:txBody>
+      </p:sp>
+      <p:grpSp>
+        <p:nvGrpSpPr>
+          <p:cNvPr id="2" name="그룹 1"/>
+          <p:cNvGrpSpPr/>
+          <p:nvPr/>
+        </p:nvGrpSpPr>
+        <p:grpSpPr>
+          <a:xfrm>
+            <a:off x="3420117" y="2792516"/>
+            <a:ext cx="5556203" cy="1644596"/>
+            <a:chOff x="3420117" y="2792516"/>
+            <a:chExt cx="5556203" cy="1644596"/>
+          </a:xfrm>
+        </p:grpSpPr>
+        <p:sp>
+          <p:nvSpPr>
+            <p:cNvPr id="6" name="직사각형 5"/>
+            <p:cNvSpPr/>
+            <p:nvPr/>
+          </p:nvSpPr>
+          <p:spPr>
+            <a:xfrm rot="10800000" flipV="1">
+              <a:off x="3628465" y="3000864"/>
+              <a:ext cx="5347855" cy="1436248"/>
+            </a:xfrm>
+            <a:prstGeom prst="rect">
+              <a:avLst/>
+            </a:prstGeom>
+            <a:solidFill>
+              <a:schemeClr val="bg1">
+                <a:lumMod val="50000"/>
+              </a:schemeClr>
+            </a:solidFill>
+            <a:ln>
+              <a:noFill/>
+            </a:ln>
+            <a:effectLst/>
+          </p:spPr>
+          <p:style>
+            <a:lnRef idx="2">
+              <a:schemeClr val="accent1">
+                <a:shade val="50000"/>
+              </a:schemeClr>
+            </a:lnRef>
+            <a:fillRef idx="1">
+              <a:schemeClr val="accent1"/>
+            </a:fillRef>
+            <a:effectRef idx="0">
+              <a:schemeClr val="accent1"/>
+            </a:effectRef>
+            <a:fontRef idx="minor">
+              <a:schemeClr val="lt1"/>
+            </a:fontRef>
+          </p:style>
+          <p:txBody>
+            <a:bodyPr rtlCol="0" anchor="ctr"/>
+            <a:lstStyle/>
+            <a:p>
+              <a:pPr algn="ctr"/>
+              <a:endParaRPr lang="ko-KR" altLang="en-US"/>
+            </a:p>
+          </p:txBody>
+        </p:sp>
+        <p:sp>
+          <p:nvSpPr>
+            <p:cNvPr id="9" name="직사각형 8"/>
+            <p:cNvSpPr/>
+            <p:nvPr/>
+          </p:nvSpPr>
+          <p:spPr>
+            <a:xfrm rot="10800000" flipV="1">
+              <a:off x="3420117" y="2792516"/>
+              <a:ext cx="5347855" cy="1436248"/>
+            </a:xfrm>
+            <a:prstGeom prst="rect">
+              <a:avLst/>
+            </a:prstGeom>
+            <a:solidFill>
+              <a:srgbClr val="C00000"/>
+            </a:solidFill>
+            <a:ln>
+              <a:noFill/>
+            </a:ln>
+            <a:effectLst/>
+          </p:spPr>
+          <p:style>
+            <a:lnRef idx="2">
+              <a:schemeClr val="accent1">
+                <a:shade val="50000"/>
+              </a:schemeClr>
+            </a:lnRef>
+            <a:fillRef idx="1">
+              <a:schemeClr val="accent1"/>
+            </a:fillRef>
+            <a:effectRef idx="0">
+              <a:schemeClr val="accent1"/>
+            </a:effectRef>
+            <a:fontRef idx="minor">
+              <a:schemeClr val="lt1"/>
+            </a:fontRef>
+          </p:style>
+          <p:txBody>
+            <a:bodyPr rtlCol="0" anchor="ctr"/>
+            <a:lstStyle/>
+            <a:p>
+              <a:pPr algn="ctr"/>
+              <a:endParaRPr lang="ko-KR" altLang="en-US"/>
+            </a:p>
+          </p:txBody>
+        </p:sp>
+      </p:grpSp>
+    </p:spTree>
+    <p:extLst>
+      <p:ext uri="{BB962C8B-B14F-4D97-AF65-F5344CB8AC3E}">
+        <p14:creationId xmlns:p14="http://schemas.microsoft.com/office/powerpoint/2010/main" val="2046622352"/>
+      </p:ext>
+    </p:extLst>
+  </p:cSld>
+  <p:clrMapOvr>
+    <a:masterClrMapping/>
+  </p:clrMapOvr>
+  <p:timing>
+    <p:tnLst>
+      <p:par>
+        <p:cTn id="1" dur="indefinite" restart="never" nodeType="tmRoot"/>
+      </p:par>
+    </p:tnLst>
+  </p:timing>
+</p:sld>
+</file>
+
 <file path=ppt/theme/theme1.xml><?xml version="1.0" encoding="utf-8"?>
 <a:theme xmlns:a="http://schemas.openxmlformats.org/drawingml/2006/main" name="Office 테마">
   <a:themeElements>

</xml_diff>

<commit_message>
[변경사항] * Icon.pptx update
[Version]
  - AssemblyInfo : 0.6.0.3
  - XML : 0.6.0.1
  - Install Package : 0.6.0.1
</commit_message>
<xml_diff>
--- a/Resources/Icon/Icon.pptx
+++ b/Resources/Icon/Icon.pptx
@@ -13,6 +13,7 @@
     <p:sldId id="261" r:id="rId7"/>
     <p:sldId id="263" r:id="rId8"/>
     <p:sldId id="264" r:id="rId9"/>
+    <p:sldId id="265" r:id="rId10"/>
   </p:sldIdLst>
   <p:sldSz cx="12192000" cy="6858000"/>
   <p:notesSz cx="6858000" cy="9144000"/>
@@ -250,7 +251,7 @@
           <a:p>
             <a:fld id="{D7F79187-E0C0-4F2A-A0F0-8B5DFD9CA2AA}" type="datetimeFigureOut">
               <a:rPr lang="ko-KR" altLang="en-US" smtClean="0"/>
-              <a:t>2020-05-22</a:t>
+              <a:t>2021-02-02</a:t>
             </a:fld>
             <a:endParaRPr lang="ko-KR" altLang="en-US"/>
           </a:p>
@@ -420,7 +421,7 @@
           <a:p>
             <a:fld id="{D7F79187-E0C0-4F2A-A0F0-8B5DFD9CA2AA}" type="datetimeFigureOut">
               <a:rPr lang="ko-KR" altLang="en-US" smtClean="0"/>
-              <a:t>2020-05-22</a:t>
+              <a:t>2021-02-02</a:t>
             </a:fld>
             <a:endParaRPr lang="ko-KR" altLang="en-US"/>
           </a:p>
@@ -600,7 +601,7 @@
           <a:p>
             <a:fld id="{D7F79187-E0C0-4F2A-A0F0-8B5DFD9CA2AA}" type="datetimeFigureOut">
               <a:rPr lang="ko-KR" altLang="en-US" smtClean="0"/>
-              <a:t>2020-05-22</a:t>
+              <a:t>2021-02-02</a:t>
             </a:fld>
             <a:endParaRPr lang="ko-KR" altLang="en-US"/>
           </a:p>
@@ -770,7 +771,7 @@
           <a:p>
             <a:fld id="{D7F79187-E0C0-4F2A-A0F0-8B5DFD9CA2AA}" type="datetimeFigureOut">
               <a:rPr lang="ko-KR" altLang="en-US" smtClean="0"/>
-              <a:t>2020-05-22</a:t>
+              <a:t>2021-02-02</a:t>
             </a:fld>
             <a:endParaRPr lang="ko-KR" altLang="en-US"/>
           </a:p>
@@ -1016,7 +1017,7 @@
           <a:p>
             <a:fld id="{D7F79187-E0C0-4F2A-A0F0-8B5DFD9CA2AA}" type="datetimeFigureOut">
               <a:rPr lang="ko-KR" altLang="en-US" smtClean="0"/>
-              <a:t>2020-05-22</a:t>
+              <a:t>2021-02-02</a:t>
             </a:fld>
             <a:endParaRPr lang="ko-KR" altLang="en-US"/>
           </a:p>
@@ -1248,7 +1249,7 @@
           <a:p>
             <a:fld id="{D7F79187-E0C0-4F2A-A0F0-8B5DFD9CA2AA}" type="datetimeFigureOut">
               <a:rPr lang="ko-KR" altLang="en-US" smtClean="0"/>
-              <a:t>2020-05-22</a:t>
+              <a:t>2021-02-02</a:t>
             </a:fld>
             <a:endParaRPr lang="ko-KR" altLang="en-US"/>
           </a:p>
@@ -1615,7 +1616,7 @@
           <a:p>
             <a:fld id="{D7F79187-E0C0-4F2A-A0F0-8B5DFD9CA2AA}" type="datetimeFigureOut">
               <a:rPr lang="ko-KR" altLang="en-US" smtClean="0"/>
-              <a:t>2020-05-22</a:t>
+              <a:t>2021-02-02</a:t>
             </a:fld>
             <a:endParaRPr lang="ko-KR" altLang="en-US"/>
           </a:p>
@@ -1733,7 +1734,7 @@
           <a:p>
             <a:fld id="{D7F79187-E0C0-4F2A-A0F0-8B5DFD9CA2AA}" type="datetimeFigureOut">
               <a:rPr lang="ko-KR" altLang="en-US" smtClean="0"/>
-              <a:t>2020-05-22</a:t>
+              <a:t>2021-02-02</a:t>
             </a:fld>
             <a:endParaRPr lang="ko-KR" altLang="en-US"/>
           </a:p>
@@ -1828,7 +1829,7 @@
           <a:p>
             <a:fld id="{D7F79187-E0C0-4F2A-A0F0-8B5DFD9CA2AA}" type="datetimeFigureOut">
               <a:rPr lang="ko-KR" altLang="en-US" smtClean="0"/>
-              <a:t>2020-05-22</a:t>
+              <a:t>2021-02-02</a:t>
             </a:fld>
             <a:endParaRPr lang="ko-KR" altLang="en-US"/>
           </a:p>
@@ -2105,7 +2106,7 @@
           <a:p>
             <a:fld id="{D7F79187-E0C0-4F2A-A0F0-8B5DFD9CA2AA}" type="datetimeFigureOut">
               <a:rPr lang="ko-KR" altLang="en-US" smtClean="0"/>
-              <a:t>2020-05-22</a:t>
+              <a:t>2021-02-02</a:t>
             </a:fld>
             <a:endParaRPr lang="ko-KR" altLang="en-US"/>
           </a:p>
@@ -2358,7 +2359,7 @@
           <a:p>
             <a:fld id="{D7F79187-E0C0-4F2A-A0F0-8B5DFD9CA2AA}" type="datetimeFigureOut">
               <a:rPr lang="ko-KR" altLang="en-US" smtClean="0"/>
-              <a:t>2020-05-22</a:t>
+              <a:t>2021-02-02</a:t>
             </a:fld>
             <a:endParaRPr lang="ko-KR" altLang="en-US"/>
           </a:p>
@@ -2571,7 +2572,7 @@
           <a:p>
             <a:fld id="{D7F79187-E0C0-4F2A-A0F0-8B5DFD9CA2AA}" type="datetimeFigureOut">
               <a:rPr lang="ko-KR" altLang="en-US" smtClean="0"/>
-              <a:t>2020-05-22</a:t>
+              <a:t>2021-02-02</a:t>
             </a:fld>
             <a:endParaRPr lang="ko-KR" altLang="en-US"/>
           </a:p>
@@ -4977,6 +4978,76 @@
 </p:sld>
 </file>
 
+<file path=ppt/slides/slide9.xml><?xml version="1.0" encoding="utf-8"?>
+<p:sld xmlns:a="http://schemas.openxmlformats.org/drawingml/2006/main" xmlns:r="http://schemas.openxmlformats.org/officeDocument/2006/relationships" xmlns:p="http://schemas.openxmlformats.org/presentationml/2006/main">
+  <p:cSld>
+    <p:spTree>
+      <p:nvGrpSpPr>
+        <p:cNvPr id="1" name=""/>
+        <p:cNvGrpSpPr/>
+        <p:nvPr/>
+      </p:nvGrpSpPr>
+      <p:grpSpPr>
+        <a:xfrm>
+          <a:off x="0" y="0"/>
+          <a:ext cx="0" cy="0"/>
+          <a:chOff x="0" y="0"/>
+          <a:chExt cx="0" cy="0"/>
+        </a:xfrm>
+      </p:grpSpPr>
+      <p:sp>
+        <p:nvSpPr>
+          <p:cNvPr id="2" name="이등변 삼각형 1"/>
+          <p:cNvSpPr/>
+          <p:nvPr/>
+        </p:nvSpPr>
+        <p:spPr>
+          <a:xfrm rot="16200000" flipH="1">
+            <a:off x="3005417" y="758945"/>
+            <a:ext cx="6181167" cy="5328592"/>
+          </a:xfrm>
+          <a:prstGeom prst="triangle">
+            <a:avLst/>
+          </a:prstGeom>
+        </p:spPr>
+        <p:style>
+          <a:lnRef idx="2">
+            <a:schemeClr val="accent1">
+              <a:shade val="50000"/>
+            </a:schemeClr>
+          </a:lnRef>
+          <a:fillRef idx="1">
+            <a:schemeClr val="accent1"/>
+          </a:fillRef>
+          <a:effectRef idx="0">
+            <a:schemeClr val="accent1"/>
+          </a:effectRef>
+          <a:fontRef idx="minor">
+            <a:schemeClr val="lt1"/>
+          </a:fontRef>
+        </p:style>
+        <p:txBody>
+          <a:bodyPr rtlCol="0" anchor="ctr"/>
+          <a:lstStyle/>
+          <a:p>
+            <a:pPr algn="ctr"/>
+            <a:endParaRPr lang="ko-KR" altLang="en-US"/>
+          </a:p>
+        </p:txBody>
+      </p:sp>
+    </p:spTree>
+    <p:extLst>
+      <p:ext uri="{BB962C8B-B14F-4D97-AF65-F5344CB8AC3E}">
+        <p14:creationId xmlns:p14="http://schemas.microsoft.com/office/powerpoint/2010/main" val="3867204705"/>
+      </p:ext>
+    </p:extLst>
+  </p:cSld>
+  <p:clrMapOvr>
+    <a:masterClrMapping/>
+  </p:clrMapOvr>
+</p:sld>
+</file>
+
 <file path=ppt/theme/theme1.xml><?xml version="1.0" encoding="utf-8"?>
 <a:theme xmlns:a="http://schemas.openxmlformats.org/drawingml/2006/main" name="Office 테마">
   <a:themeElements>

</xml_diff>